<commit_message>
Modificacoes em cima das criticas do Takai
</commit_message>
<xml_diff>
--- a/15. Arquitetura de Negócio para cada Cenário.pptx.pptx
+++ b/15. Arquitetura de Negócio para cada Cenário.pptx.pptx
@@ -216,7 +216,7 @@
             <a:fld id="{258E502B-CFFF-4977-BA55-B253021E2457}" type="datetimeFigureOut">
               <a:rPr lang="pt-BR" smtClean="0"/>
               <a:pPr/>
-              <a:t>20/09/2020</a:t>
+              <a:t>07/10/2020</a:t>
             </a:fld>
             <a:endParaRPr lang="pt-BR"/>
           </a:p>
@@ -632,7 +632,7 @@
             <a:fld id="{362C238F-AFC2-456F-A70E-2BEB777654C4}" type="datetimeFigureOut">
               <a:rPr lang="pt-BR" smtClean="0"/>
               <a:pPr/>
-              <a:t>20/09/2020</a:t>
+              <a:t>07/10/2020</a:t>
             </a:fld>
             <a:endParaRPr lang="pt-BR"/>
           </a:p>
@@ -832,7 +832,7 @@
             <a:fld id="{362C238F-AFC2-456F-A70E-2BEB777654C4}" type="datetimeFigureOut">
               <a:rPr lang="pt-BR" smtClean="0"/>
               <a:pPr/>
-              <a:t>20/09/2020</a:t>
+              <a:t>07/10/2020</a:t>
             </a:fld>
             <a:endParaRPr lang="pt-BR"/>
           </a:p>
@@ -1042,7 +1042,7 @@
             <a:fld id="{362C238F-AFC2-456F-A70E-2BEB777654C4}" type="datetimeFigureOut">
               <a:rPr lang="pt-BR" smtClean="0"/>
               <a:pPr/>
-              <a:t>20/09/2020</a:t>
+              <a:t>07/10/2020</a:t>
             </a:fld>
             <a:endParaRPr lang="pt-BR"/>
           </a:p>
@@ -1242,7 +1242,7 @@
             <a:fld id="{362C238F-AFC2-456F-A70E-2BEB777654C4}" type="datetimeFigureOut">
               <a:rPr lang="pt-BR" smtClean="0"/>
               <a:pPr/>
-              <a:t>20/09/2020</a:t>
+              <a:t>07/10/2020</a:t>
             </a:fld>
             <a:endParaRPr lang="pt-BR"/>
           </a:p>
@@ -1519,7 +1519,7 @@
             <a:fld id="{362C238F-AFC2-456F-A70E-2BEB777654C4}" type="datetimeFigureOut">
               <a:rPr lang="pt-BR" smtClean="0"/>
               <a:pPr/>
-              <a:t>20/09/2020</a:t>
+              <a:t>07/10/2020</a:t>
             </a:fld>
             <a:endParaRPr lang="pt-BR"/>
           </a:p>
@@ -1786,7 +1786,7 @@
             <a:fld id="{362C238F-AFC2-456F-A70E-2BEB777654C4}" type="datetimeFigureOut">
               <a:rPr lang="pt-BR" smtClean="0"/>
               <a:pPr/>
-              <a:t>20/09/2020</a:t>
+              <a:t>07/10/2020</a:t>
             </a:fld>
             <a:endParaRPr lang="pt-BR"/>
           </a:p>
@@ -2200,7 +2200,7 @@
             <a:fld id="{362C238F-AFC2-456F-A70E-2BEB777654C4}" type="datetimeFigureOut">
               <a:rPr lang="pt-BR" smtClean="0"/>
               <a:pPr/>
-              <a:t>20/09/2020</a:t>
+              <a:t>07/10/2020</a:t>
             </a:fld>
             <a:endParaRPr lang="pt-BR"/>
           </a:p>
@@ -2343,7 +2343,7 @@
             <a:fld id="{362C238F-AFC2-456F-A70E-2BEB777654C4}" type="datetimeFigureOut">
               <a:rPr lang="pt-BR" smtClean="0"/>
               <a:pPr/>
-              <a:t>20/09/2020</a:t>
+              <a:t>07/10/2020</a:t>
             </a:fld>
             <a:endParaRPr lang="pt-BR"/>
           </a:p>
@@ -2458,7 +2458,7 @@
             <a:fld id="{362C238F-AFC2-456F-A70E-2BEB777654C4}" type="datetimeFigureOut">
               <a:rPr lang="pt-BR" smtClean="0"/>
               <a:pPr/>
-              <a:t>20/09/2020</a:t>
+              <a:t>07/10/2020</a:t>
             </a:fld>
             <a:endParaRPr lang="pt-BR"/>
           </a:p>
@@ -2771,7 +2771,7 @@
             <a:fld id="{362C238F-AFC2-456F-A70E-2BEB777654C4}" type="datetimeFigureOut">
               <a:rPr lang="pt-BR" smtClean="0"/>
               <a:pPr/>
-              <a:t>20/09/2020</a:t>
+              <a:t>07/10/2020</a:t>
             </a:fld>
             <a:endParaRPr lang="pt-BR"/>
           </a:p>
@@ -3061,7 +3061,7 @@
             <a:fld id="{362C238F-AFC2-456F-A70E-2BEB777654C4}" type="datetimeFigureOut">
               <a:rPr lang="pt-BR" smtClean="0"/>
               <a:pPr/>
-              <a:t>20/09/2020</a:t>
+              <a:t>07/10/2020</a:t>
             </a:fld>
             <a:endParaRPr lang="pt-BR"/>
           </a:p>
@@ -3304,7 +3304,7 @@
             <a:fld id="{362C238F-AFC2-456F-A70E-2BEB777654C4}" type="datetimeFigureOut">
               <a:rPr lang="pt-BR" smtClean="0"/>
               <a:pPr/>
-              <a:t>20/09/2020</a:t>
+              <a:t>07/10/2020</a:t>
             </a:fld>
             <a:endParaRPr lang="pt-BR"/>
           </a:p>

</xml_diff>

<commit_message>
Correção ate o DFD ac5
</commit_message>
<xml_diff>
--- a/15. Arquitetura de Negócio para cada Cenário.pptx.pptx
+++ b/15. Arquitetura de Negócio para cada Cenário.pptx.pptx
@@ -216,7 +216,7 @@
             <a:fld id="{258E502B-CFFF-4977-BA55-B253021E2457}" type="datetimeFigureOut">
               <a:rPr lang="pt-BR" smtClean="0"/>
               <a:pPr/>
-              <a:t>07/10/2020</a:t>
+              <a:t>11/11/2020</a:t>
             </a:fld>
             <a:endParaRPr lang="pt-BR"/>
           </a:p>
@@ -632,7 +632,7 @@
             <a:fld id="{362C238F-AFC2-456F-A70E-2BEB777654C4}" type="datetimeFigureOut">
               <a:rPr lang="pt-BR" smtClean="0"/>
               <a:pPr/>
-              <a:t>07/10/2020</a:t>
+              <a:t>11/11/2020</a:t>
             </a:fld>
             <a:endParaRPr lang="pt-BR"/>
           </a:p>
@@ -832,7 +832,7 @@
             <a:fld id="{362C238F-AFC2-456F-A70E-2BEB777654C4}" type="datetimeFigureOut">
               <a:rPr lang="pt-BR" smtClean="0"/>
               <a:pPr/>
-              <a:t>07/10/2020</a:t>
+              <a:t>11/11/2020</a:t>
             </a:fld>
             <a:endParaRPr lang="pt-BR"/>
           </a:p>
@@ -1042,7 +1042,7 @@
             <a:fld id="{362C238F-AFC2-456F-A70E-2BEB777654C4}" type="datetimeFigureOut">
               <a:rPr lang="pt-BR" smtClean="0"/>
               <a:pPr/>
-              <a:t>07/10/2020</a:t>
+              <a:t>11/11/2020</a:t>
             </a:fld>
             <a:endParaRPr lang="pt-BR"/>
           </a:p>
@@ -1242,7 +1242,7 @@
             <a:fld id="{362C238F-AFC2-456F-A70E-2BEB777654C4}" type="datetimeFigureOut">
               <a:rPr lang="pt-BR" smtClean="0"/>
               <a:pPr/>
-              <a:t>07/10/2020</a:t>
+              <a:t>11/11/2020</a:t>
             </a:fld>
             <a:endParaRPr lang="pt-BR"/>
           </a:p>
@@ -1519,7 +1519,7 @@
             <a:fld id="{362C238F-AFC2-456F-A70E-2BEB777654C4}" type="datetimeFigureOut">
               <a:rPr lang="pt-BR" smtClean="0"/>
               <a:pPr/>
-              <a:t>07/10/2020</a:t>
+              <a:t>11/11/2020</a:t>
             </a:fld>
             <a:endParaRPr lang="pt-BR"/>
           </a:p>
@@ -1786,7 +1786,7 @@
             <a:fld id="{362C238F-AFC2-456F-A70E-2BEB777654C4}" type="datetimeFigureOut">
               <a:rPr lang="pt-BR" smtClean="0"/>
               <a:pPr/>
-              <a:t>07/10/2020</a:t>
+              <a:t>11/11/2020</a:t>
             </a:fld>
             <a:endParaRPr lang="pt-BR"/>
           </a:p>
@@ -2200,7 +2200,7 @@
             <a:fld id="{362C238F-AFC2-456F-A70E-2BEB777654C4}" type="datetimeFigureOut">
               <a:rPr lang="pt-BR" smtClean="0"/>
               <a:pPr/>
-              <a:t>07/10/2020</a:t>
+              <a:t>11/11/2020</a:t>
             </a:fld>
             <a:endParaRPr lang="pt-BR"/>
           </a:p>
@@ -2343,7 +2343,7 @@
             <a:fld id="{362C238F-AFC2-456F-A70E-2BEB777654C4}" type="datetimeFigureOut">
               <a:rPr lang="pt-BR" smtClean="0"/>
               <a:pPr/>
-              <a:t>07/10/2020</a:t>
+              <a:t>11/11/2020</a:t>
             </a:fld>
             <a:endParaRPr lang="pt-BR"/>
           </a:p>
@@ -2458,7 +2458,7 @@
             <a:fld id="{362C238F-AFC2-456F-A70E-2BEB777654C4}" type="datetimeFigureOut">
               <a:rPr lang="pt-BR" smtClean="0"/>
               <a:pPr/>
-              <a:t>07/10/2020</a:t>
+              <a:t>11/11/2020</a:t>
             </a:fld>
             <a:endParaRPr lang="pt-BR"/>
           </a:p>
@@ -2771,7 +2771,7 @@
             <a:fld id="{362C238F-AFC2-456F-A70E-2BEB777654C4}" type="datetimeFigureOut">
               <a:rPr lang="pt-BR" smtClean="0"/>
               <a:pPr/>
-              <a:t>07/10/2020</a:t>
+              <a:t>11/11/2020</a:t>
             </a:fld>
             <a:endParaRPr lang="pt-BR"/>
           </a:p>
@@ -3061,7 +3061,7 @@
             <a:fld id="{362C238F-AFC2-456F-A70E-2BEB777654C4}" type="datetimeFigureOut">
               <a:rPr lang="pt-BR" smtClean="0"/>
               <a:pPr/>
-              <a:t>07/10/2020</a:t>
+              <a:t>11/11/2020</a:t>
             </a:fld>
             <a:endParaRPr lang="pt-BR"/>
           </a:p>
@@ -3304,7 +3304,7 @@
             <a:fld id="{362C238F-AFC2-456F-A70E-2BEB777654C4}" type="datetimeFigureOut">
               <a:rPr lang="pt-BR" smtClean="0"/>
               <a:pPr/>
-              <a:t>07/10/2020</a:t>
+              <a:t>11/11/2020</a:t>
             </a:fld>
             <a:endParaRPr lang="pt-BR"/>
           </a:p>

</xml_diff>